<commit_message>
include e-commerce business model section to readme file
</commit_message>
<xml_diff>
--- a/documents/SEO - Search Engine Optimization.pptx
+++ b/documents/SEO - Search Engine Optimization.pptx
@@ -6,8 +6,9 @@
   </p:sldMasterIdLst>
   <p:sldIdLst>
     <p:sldId id="256" r:id="rId2"/>
-    <p:sldId id="257" r:id="rId3"/>
-    <p:sldId id="258" r:id="rId4"/>
+    <p:sldId id="259" r:id="rId3"/>
+    <p:sldId id="257" r:id="rId4"/>
+    <p:sldId id="258" r:id="rId5"/>
   </p:sldIdLst>
   <p:sldSz cx="12192000" cy="6858000"/>
   <p:notesSz cx="6858000" cy="9144000"/>
@@ -263,7 +264,7 @@
           <a:p>
             <a:fld id="{C37432C2-04A9-4406-9E9C-07D652109426}" type="datetimeFigureOut">
               <a:rPr lang="en-GB" smtClean="0"/>
-              <a:t>19/07/2022</a:t>
+              <a:t>16/08/2022</a:t>
             </a:fld>
             <a:endParaRPr lang="en-GB"/>
           </a:p>
@@ -463,7 +464,7 @@
           <a:p>
             <a:fld id="{C37432C2-04A9-4406-9E9C-07D652109426}" type="datetimeFigureOut">
               <a:rPr lang="en-GB" smtClean="0"/>
-              <a:t>19/07/2022</a:t>
+              <a:t>16/08/2022</a:t>
             </a:fld>
             <a:endParaRPr lang="en-GB"/>
           </a:p>
@@ -673,7 +674,7 @@
           <a:p>
             <a:fld id="{C37432C2-04A9-4406-9E9C-07D652109426}" type="datetimeFigureOut">
               <a:rPr lang="en-GB" smtClean="0"/>
-              <a:t>19/07/2022</a:t>
+              <a:t>16/08/2022</a:t>
             </a:fld>
             <a:endParaRPr lang="en-GB"/>
           </a:p>
@@ -873,7 +874,7 @@
           <a:p>
             <a:fld id="{C37432C2-04A9-4406-9E9C-07D652109426}" type="datetimeFigureOut">
               <a:rPr lang="en-GB" smtClean="0"/>
-              <a:t>19/07/2022</a:t>
+              <a:t>16/08/2022</a:t>
             </a:fld>
             <a:endParaRPr lang="en-GB"/>
           </a:p>
@@ -1149,7 +1150,7 @@
           <a:p>
             <a:fld id="{C37432C2-04A9-4406-9E9C-07D652109426}" type="datetimeFigureOut">
               <a:rPr lang="en-GB" smtClean="0"/>
-              <a:t>19/07/2022</a:t>
+              <a:t>16/08/2022</a:t>
             </a:fld>
             <a:endParaRPr lang="en-GB"/>
           </a:p>
@@ -1417,7 +1418,7 @@
           <a:p>
             <a:fld id="{C37432C2-04A9-4406-9E9C-07D652109426}" type="datetimeFigureOut">
               <a:rPr lang="en-GB" smtClean="0"/>
-              <a:t>19/07/2022</a:t>
+              <a:t>16/08/2022</a:t>
             </a:fld>
             <a:endParaRPr lang="en-GB"/>
           </a:p>
@@ -1832,7 +1833,7 @@
           <a:p>
             <a:fld id="{C37432C2-04A9-4406-9E9C-07D652109426}" type="datetimeFigureOut">
               <a:rPr lang="en-GB" smtClean="0"/>
-              <a:t>19/07/2022</a:t>
+              <a:t>16/08/2022</a:t>
             </a:fld>
             <a:endParaRPr lang="en-GB"/>
           </a:p>
@@ -1974,7 +1975,7 @@
           <a:p>
             <a:fld id="{C37432C2-04A9-4406-9E9C-07D652109426}" type="datetimeFigureOut">
               <a:rPr lang="en-GB" smtClean="0"/>
-              <a:t>19/07/2022</a:t>
+              <a:t>16/08/2022</a:t>
             </a:fld>
             <a:endParaRPr lang="en-GB"/>
           </a:p>
@@ -2087,7 +2088,7 @@
           <a:p>
             <a:fld id="{C37432C2-04A9-4406-9E9C-07D652109426}" type="datetimeFigureOut">
               <a:rPr lang="en-GB" smtClean="0"/>
-              <a:t>19/07/2022</a:t>
+              <a:t>16/08/2022</a:t>
             </a:fld>
             <a:endParaRPr lang="en-GB"/>
           </a:p>
@@ -2400,7 +2401,7 @@
           <a:p>
             <a:fld id="{C37432C2-04A9-4406-9E9C-07D652109426}" type="datetimeFigureOut">
               <a:rPr lang="en-GB" smtClean="0"/>
-              <a:t>19/07/2022</a:t>
+              <a:t>16/08/2022</a:t>
             </a:fld>
             <a:endParaRPr lang="en-GB"/>
           </a:p>
@@ -2689,7 +2690,7 @@
           <a:p>
             <a:fld id="{C37432C2-04A9-4406-9E9C-07D652109426}" type="datetimeFigureOut">
               <a:rPr lang="en-GB" smtClean="0"/>
-              <a:t>19/07/2022</a:t>
+              <a:t>16/08/2022</a:t>
             </a:fld>
             <a:endParaRPr lang="en-GB"/>
           </a:p>
@@ -2932,7 +2933,7 @@
           <a:p>
             <a:fld id="{C37432C2-04A9-4406-9E9C-07D652109426}" type="datetimeFigureOut">
               <a:rPr lang="en-GB" smtClean="0"/>
-              <a:t>19/07/2022</a:t>
+              <a:t>16/08/2022</a:t>
             </a:fld>
             <a:endParaRPr lang="en-GB"/>
           </a:p>
@@ -3351,10 +3352,10 @@
       </p:grpSpPr>
       <p:sp>
         <p:nvSpPr>
-          <p:cNvPr id="4" name="TextBox 3">
-            <a:extLst>
-              <a:ext uri="{FF2B5EF4-FFF2-40B4-BE49-F238E27FC236}">
-                <a16:creationId xmlns:a16="http://schemas.microsoft.com/office/drawing/2014/main" id="{EC8E180F-7978-8AEF-B7AF-BD5F10A57407}"/>
+          <p:cNvPr id="6" name="TextBox 5">
+            <a:extLst>
+              <a:ext uri="{FF2B5EF4-FFF2-40B4-BE49-F238E27FC236}">
+                <a16:creationId xmlns:a16="http://schemas.microsoft.com/office/drawing/2014/main" id="{7627AE08-036B-7A56-0381-B7DF8B545C31}"/>
               </a:ext>
             </a:extLst>
           </p:cNvPr>
@@ -3363,8 +3364,497 @@
         </p:nvSpPr>
         <p:spPr>
           <a:xfrm>
-            <a:off x="0" y="94132"/>
-            <a:ext cx="12192000" cy="369332"/>
+            <a:off x="4630270" y="2637865"/>
+            <a:ext cx="2931459" cy="369332"/>
+          </a:xfrm>
+          <a:prstGeom prst="rect">
+            <a:avLst/>
+          </a:prstGeom>
+          <a:solidFill>
+            <a:schemeClr val="accent1"/>
+          </a:solidFill>
+          <a:ln>
+            <a:solidFill>
+              <a:schemeClr val="accent1"/>
+            </a:solidFill>
+          </a:ln>
+        </p:spPr>
+        <p:txBody>
+          <a:bodyPr wrap="square" rtlCol="0">
+            <a:spAutoFit/>
+          </a:bodyPr>
+          <a:lstStyle/>
+          <a:p>
+            <a:pPr algn="ctr"/>
+            <a:r>
+              <a:rPr lang="en-GB" dirty="0">
+                <a:solidFill>
+                  <a:schemeClr val="bg1"/>
+                </a:solidFill>
+              </a:rPr>
+              <a:t>E-commerce Business Model</a:t>
+            </a:r>
+          </a:p>
+        </p:txBody>
+      </p:sp>
+      <p:sp>
+        <p:nvSpPr>
+          <p:cNvPr id="7" name="TextBox 6">
+            <a:extLst>
+              <a:ext uri="{FF2B5EF4-FFF2-40B4-BE49-F238E27FC236}">
+                <a16:creationId xmlns:a16="http://schemas.microsoft.com/office/drawing/2014/main" id="{EF1F3E8A-B486-2052-A699-8D4F3CC08849}"/>
+              </a:ext>
+            </a:extLst>
+          </p:cNvPr>
+          <p:cNvSpPr txBox="1"/>
+          <p:nvPr/>
+        </p:nvSpPr>
+        <p:spPr>
+          <a:xfrm>
+            <a:off x="5363134" y="3462618"/>
+            <a:ext cx="1465730" cy="369332"/>
+          </a:xfrm>
+          <a:prstGeom prst="rect">
+            <a:avLst/>
+          </a:prstGeom>
+          <a:solidFill>
+            <a:schemeClr val="accent1"/>
+          </a:solidFill>
+          <a:ln>
+            <a:solidFill>
+              <a:schemeClr val="accent1"/>
+            </a:solidFill>
+          </a:ln>
+        </p:spPr>
+        <p:txBody>
+          <a:bodyPr wrap="square" rtlCol="0">
+            <a:spAutoFit/>
+          </a:bodyPr>
+          <a:lstStyle>
+            <a:defPPr>
+              <a:defRPr lang="en-US"/>
+            </a:defPPr>
+            <a:lvl1pPr>
+              <a:defRPr>
+                <a:solidFill>
+                  <a:schemeClr val="bg1"/>
+                </a:solidFill>
+              </a:defRPr>
+            </a:lvl1pPr>
+          </a:lstStyle>
+          <a:p>
+            <a:pPr algn="ctr"/>
+            <a:r>
+              <a:rPr lang="en-GB" dirty="0"/>
+              <a:t>Direct</a:t>
+            </a:r>
+          </a:p>
+        </p:txBody>
+      </p:sp>
+      <p:sp>
+        <p:nvSpPr>
+          <p:cNvPr id="8" name="TextBox 7">
+            <a:extLst>
+              <a:ext uri="{FF2B5EF4-FFF2-40B4-BE49-F238E27FC236}">
+                <a16:creationId xmlns:a16="http://schemas.microsoft.com/office/drawing/2014/main" id="{B2286E5F-4C21-14EA-7D2E-461127AD7991}"/>
+              </a:ext>
+            </a:extLst>
+          </p:cNvPr>
+          <p:cNvSpPr txBox="1"/>
+          <p:nvPr/>
+        </p:nvSpPr>
+        <p:spPr>
+          <a:xfrm>
+            <a:off x="6483727" y="4676412"/>
+            <a:ext cx="1465730" cy="369332"/>
+          </a:xfrm>
+          <a:prstGeom prst="rect">
+            <a:avLst/>
+          </a:prstGeom>
+          <a:solidFill>
+            <a:schemeClr val="accent1"/>
+          </a:solidFill>
+          <a:ln>
+            <a:solidFill>
+              <a:schemeClr val="accent1"/>
+            </a:solidFill>
+          </a:ln>
+        </p:spPr>
+        <p:txBody>
+          <a:bodyPr wrap="square" rtlCol="0">
+            <a:spAutoFit/>
+          </a:bodyPr>
+          <a:lstStyle>
+            <a:defPPr>
+              <a:defRPr lang="en-US"/>
+            </a:defPPr>
+            <a:lvl1pPr algn="ctr">
+              <a:defRPr>
+                <a:solidFill>
+                  <a:schemeClr val="bg1"/>
+                </a:solidFill>
+              </a:defRPr>
+            </a:lvl1pPr>
+          </a:lstStyle>
+          <a:p>
+            <a:r>
+              <a:rPr lang="en-GB" dirty="0"/>
+              <a:t>B2C</a:t>
+            </a:r>
+          </a:p>
+        </p:txBody>
+      </p:sp>
+      <p:sp>
+        <p:nvSpPr>
+          <p:cNvPr id="9" name="TextBox 8">
+            <a:extLst>
+              <a:ext uri="{FF2B5EF4-FFF2-40B4-BE49-F238E27FC236}">
+                <a16:creationId xmlns:a16="http://schemas.microsoft.com/office/drawing/2014/main" id="{4CC0C39C-600B-FD5B-AE3A-B4F61E651863}"/>
+              </a:ext>
+            </a:extLst>
+          </p:cNvPr>
+          <p:cNvSpPr txBox="1"/>
+          <p:nvPr/>
+        </p:nvSpPr>
+        <p:spPr>
+          <a:xfrm>
+            <a:off x="4242545" y="4676412"/>
+            <a:ext cx="1465730" cy="369332"/>
+          </a:xfrm>
+          <a:prstGeom prst="rect">
+            <a:avLst/>
+          </a:prstGeom>
+          <a:solidFill>
+            <a:schemeClr val="accent1"/>
+          </a:solidFill>
+          <a:ln>
+            <a:solidFill>
+              <a:schemeClr val="accent1"/>
+            </a:solidFill>
+          </a:ln>
+        </p:spPr>
+        <p:txBody>
+          <a:bodyPr wrap="square" rtlCol="0">
+            <a:spAutoFit/>
+          </a:bodyPr>
+          <a:lstStyle>
+            <a:defPPr>
+              <a:defRPr lang="en-US"/>
+            </a:defPPr>
+            <a:lvl1pPr algn="ctr">
+              <a:defRPr>
+                <a:solidFill>
+                  <a:schemeClr val="bg1"/>
+                </a:solidFill>
+              </a:defRPr>
+            </a:lvl1pPr>
+          </a:lstStyle>
+          <a:p>
+            <a:r>
+              <a:rPr lang="en-GB" dirty="0"/>
+              <a:t>B2B</a:t>
+            </a:r>
+          </a:p>
+        </p:txBody>
+      </p:sp>
+      <p:sp>
+        <p:nvSpPr>
+          <p:cNvPr id="10" name="TextBox 9">
+            <a:extLst>
+              <a:ext uri="{FF2B5EF4-FFF2-40B4-BE49-F238E27FC236}">
+                <a16:creationId xmlns:a16="http://schemas.microsoft.com/office/drawing/2014/main" id="{7AA2044B-0879-4821-C9EF-6A1F987EEB6F}"/>
+              </a:ext>
+            </a:extLst>
+          </p:cNvPr>
+          <p:cNvSpPr txBox="1"/>
+          <p:nvPr/>
+        </p:nvSpPr>
+        <p:spPr>
+          <a:xfrm>
+            <a:off x="5363134" y="5913325"/>
+            <a:ext cx="1465730" cy="369332"/>
+          </a:xfrm>
+          <a:prstGeom prst="rect">
+            <a:avLst/>
+          </a:prstGeom>
+          <a:solidFill>
+            <a:schemeClr val="accent1"/>
+          </a:solidFill>
+          <a:ln>
+            <a:solidFill>
+              <a:schemeClr val="accent1"/>
+            </a:solidFill>
+          </a:ln>
+        </p:spPr>
+        <p:txBody>
+          <a:bodyPr wrap="square" rtlCol="0">
+            <a:spAutoFit/>
+          </a:bodyPr>
+          <a:lstStyle>
+            <a:defPPr>
+              <a:defRPr lang="en-US"/>
+            </a:defPPr>
+            <a:lvl1pPr algn="ctr">
+              <a:defRPr>
+                <a:solidFill>
+                  <a:schemeClr val="bg1"/>
+                </a:solidFill>
+              </a:defRPr>
+            </a:lvl1pPr>
+          </a:lstStyle>
+          <a:p>
+            <a:r>
+              <a:rPr lang="en-GB" dirty="0"/>
+              <a:t>Transactional</a:t>
+            </a:r>
+          </a:p>
+        </p:txBody>
+      </p:sp>
+      <p:cxnSp>
+        <p:nvCxnSpPr>
+          <p:cNvPr id="12" name="Straight Connector 11">
+            <a:extLst>
+              <a:ext uri="{FF2B5EF4-FFF2-40B4-BE49-F238E27FC236}">
+                <a16:creationId xmlns:a16="http://schemas.microsoft.com/office/drawing/2014/main" id="{CA173241-6DD0-3E91-72A9-586FC4C7F2E0}"/>
+              </a:ext>
+            </a:extLst>
+          </p:cNvPr>
+          <p:cNvCxnSpPr>
+            <a:stCxn id="6" idx="2"/>
+            <a:endCxn id="7" idx="0"/>
+          </p:cNvCxnSpPr>
+          <p:nvPr/>
+        </p:nvCxnSpPr>
+        <p:spPr>
+          <a:xfrm flipH="1">
+            <a:off x="6095999" y="3007197"/>
+            <a:ext cx="1" cy="455421"/>
+          </a:xfrm>
+          <a:prstGeom prst="line">
+            <a:avLst/>
+          </a:prstGeom>
+        </p:spPr>
+        <p:style>
+          <a:lnRef idx="1">
+            <a:schemeClr val="accent1"/>
+          </a:lnRef>
+          <a:fillRef idx="0">
+            <a:schemeClr val="accent1"/>
+          </a:fillRef>
+          <a:effectRef idx="0">
+            <a:schemeClr val="accent1"/>
+          </a:effectRef>
+          <a:fontRef idx="minor">
+            <a:schemeClr val="tx1"/>
+          </a:fontRef>
+        </p:style>
+      </p:cxnSp>
+      <p:cxnSp>
+        <p:nvCxnSpPr>
+          <p:cNvPr id="13" name="Straight Connector 12">
+            <a:extLst>
+              <a:ext uri="{FF2B5EF4-FFF2-40B4-BE49-F238E27FC236}">
+                <a16:creationId xmlns:a16="http://schemas.microsoft.com/office/drawing/2014/main" id="{02FC7602-C793-084D-4685-4B76CBA96001}"/>
+              </a:ext>
+            </a:extLst>
+          </p:cNvPr>
+          <p:cNvCxnSpPr>
+            <a:cxnSpLocks/>
+            <a:stCxn id="7" idx="2"/>
+            <a:endCxn id="8" idx="0"/>
+          </p:cNvCxnSpPr>
+          <p:nvPr/>
+        </p:nvCxnSpPr>
+        <p:spPr>
+          <a:xfrm>
+            <a:off x="6095999" y="3831950"/>
+            <a:ext cx="1120593" cy="844462"/>
+          </a:xfrm>
+          <a:prstGeom prst="line">
+            <a:avLst/>
+          </a:prstGeom>
+        </p:spPr>
+        <p:style>
+          <a:lnRef idx="1">
+            <a:schemeClr val="accent1"/>
+          </a:lnRef>
+          <a:fillRef idx="0">
+            <a:schemeClr val="accent1"/>
+          </a:fillRef>
+          <a:effectRef idx="0">
+            <a:schemeClr val="accent1"/>
+          </a:effectRef>
+          <a:fontRef idx="minor">
+            <a:schemeClr val="tx1"/>
+          </a:fontRef>
+        </p:style>
+      </p:cxnSp>
+      <p:cxnSp>
+        <p:nvCxnSpPr>
+          <p:cNvPr id="16" name="Straight Connector 15">
+            <a:extLst>
+              <a:ext uri="{FF2B5EF4-FFF2-40B4-BE49-F238E27FC236}">
+                <a16:creationId xmlns:a16="http://schemas.microsoft.com/office/drawing/2014/main" id="{F1D4B667-C486-DFDF-C891-CA1AE10316B6}"/>
+              </a:ext>
+            </a:extLst>
+          </p:cNvPr>
+          <p:cNvCxnSpPr>
+            <a:cxnSpLocks/>
+            <a:stCxn id="7" idx="2"/>
+            <a:endCxn id="9" idx="0"/>
+          </p:cNvCxnSpPr>
+          <p:nvPr/>
+        </p:nvCxnSpPr>
+        <p:spPr>
+          <a:xfrm flipH="1">
+            <a:off x="4975410" y="3831950"/>
+            <a:ext cx="1120589" cy="844462"/>
+          </a:xfrm>
+          <a:prstGeom prst="line">
+            <a:avLst/>
+          </a:prstGeom>
+        </p:spPr>
+        <p:style>
+          <a:lnRef idx="1">
+            <a:schemeClr val="accent1"/>
+          </a:lnRef>
+          <a:fillRef idx="0">
+            <a:schemeClr val="accent1"/>
+          </a:fillRef>
+          <a:effectRef idx="0">
+            <a:schemeClr val="accent1"/>
+          </a:effectRef>
+          <a:fontRef idx="minor">
+            <a:schemeClr val="tx1"/>
+          </a:fontRef>
+        </p:style>
+      </p:cxnSp>
+      <p:cxnSp>
+        <p:nvCxnSpPr>
+          <p:cNvPr id="19" name="Straight Connector 18">
+            <a:extLst>
+              <a:ext uri="{FF2B5EF4-FFF2-40B4-BE49-F238E27FC236}">
+                <a16:creationId xmlns:a16="http://schemas.microsoft.com/office/drawing/2014/main" id="{BAE80236-793D-07D1-EEA9-0D206A4AF487}"/>
+              </a:ext>
+            </a:extLst>
+          </p:cNvPr>
+          <p:cNvCxnSpPr>
+            <a:cxnSpLocks/>
+            <a:stCxn id="9" idx="2"/>
+            <a:endCxn id="10" idx="0"/>
+          </p:cNvCxnSpPr>
+          <p:nvPr/>
+        </p:nvCxnSpPr>
+        <p:spPr>
+          <a:xfrm>
+            <a:off x="4975410" y="5045744"/>
+            <a:ext cx="1120589" cy="867581"/>
+          </a:xfrm>
+          <a:prstGeom prst="line">
+            <a:avLst/>
+          </a:prstGeom>
+        </p:spPr>
+        <p:style>
+          <a:lnRef idx="1">
+            <a:schemeClr val="accent1"/>
+          </a:lnRef>
+          <a:fillRef idx="0">
+            <a:schemeClr val="accent1"/>
+          </a:fillRef>
+          <a:effectRef idx="0">
+            <a:schemeClr val="accent1"/>
+          </a:effectRef>
+          <a:fontRef idx="minor">
+            <a:schemeClr val="tx1"/>
+          </a:fontRef>
+        </p:style>
+      </p:cxnSp>
+      <p:cxnSp>
+        <p:nvCxnSpPr>
+          <p:cNvPr id="22" name="Straight Connector 21">
+            <a:extLst>
+              <a:ext uri="{FF2B5EF4-FFF2-40B4-BE49-F238E27FC236}">
+                <a16:creationId xmlns:a16="http://schemas.microsoft.com/office/drawing/2014/main" id="{0D2AAD73-7725-17AB-D51D-431746E304BF}"/>
+              </a:ext>
+            </a:extLst>
+          </p:cNvPr>
+          <p:cNvCxnSpPr>
+            <a:cxnSpLocks/>
+            <a:stCxn id="10" idx="0"/>
+            <a:endCxn id="8" idx="2"/>
+          </p:cNvCxnSpPr>
+          <p:nvPr/>
+        </p:nvCxnSpPr>
+        <p:spPr>
+          <a:xfrm flipV="1">
+            <a:off x="6095999" y="5045744"/>
+            <a:ext cx="1120593" cy="867581"/>
+          </a:xfrm>
+          <a:prstGeom prst="line">
+            <a:avLst/>
+          </a:prstGeom>
+        </p:spPr>
+        <p:style>
+          <a:lnRef idx="1">
+            <a:schemeClr val="accent1"/>
+          </a:lnRef>
+          <a:fillRef idx="0">
+            <a:schemeClr val="accent1"/>
+          </a:fillRef>
+          <a:effectRef idx="0">
+            <a:schemeClr val="accent1"/>
+          </a:effectRef>
+          <a:fontRef idx="minor">
+            <a:schemeClr val="tx1"/>
+          </a:fontRef>
+        </p:style>
+      </p:cxnSp>
+      <p:pic>
+        <p:nvPicPr>
+          <p:cNvPr id="27" name="Picture 26">
+            <a:extLst>
+              <a:ext uri="{FF2B5EF4-FFF2-40B4-BE49-F238E27FC236}">
+                <a16:creationId xmlns:a16="http://schemas.microsoft.com/office/drawing/2014/main" id="{82426FA9-B8A0-5750-5913-9015C477AFE6}"/>
+              </a:ext>
+            </a:extLst>
+          </p:cNvPr>
+          <p:cNvPicPr>
+            <a:picLocks noChangeAspect="1"/>
+          </p:cNvPicPr>
+          <p:nvPr/>
+        </p:nvPicPr>
+        <p:blipFill>
+          <a:blip r:embed="rId2"/>
+          <a:stretch>
+            <a:fillRect/>
+          </a:stretch>
+        </p:blipFill>
+        <p:spPr>
+          <a:xfrm>
+            <a:off x="112593" y="92026"/>
+            <a:ext cx="1705213" cy="704948"/>
+          </a:xfrm>
+          <a:prstGeom prst="rect">
+            <a:avLst/>
+          </a:prstGeom>
+        </p:spPr>
+      </p:pic>
+      <p:sp>
+        <p:nvSpPr>
+          <p:cNvPr id="28" name="TextBox 27">
+            <a:extLst>
+              <a:ext uri="{FF2B5EF4-FFF2-40B4-BE49-F238E27FC236}">
+                <a16:creationId xmlns:a16="http://schemas.microsoft.com/office/drawing/2014/main" id="{BC6C8945-697F-CBD1-A0E2-E4590CD798F2}"/>
+              </a:ext>
+            </a:extLst>
+          </p:cNvPr>
+          <p:cNvSpPr txBox="1"/>
+          <p:nvPr/>
+        </p:nvSpPr>
+        <p:spPr>
+          <a:xfrm>
+            <a:off x="393700" y="968650"/>
+            <a:ext cx="11061700" cy="1708160"/>
           </a:xfrm>
           <a:prstGeom prst="rect">
             <a:avLst/>
@@ -3377,196 +3867,31 @@
           </a:bodyPr>
           <a:lstStyle/>
           <a:p>
-            <a:pPr algn="ctr"/>
-            <a:r>
-              <a:rPr lang="en-GB" dirty="0"/>
-              <a:t>C-Soars ltd, UAV / Drone Survey Company - SEO</a:t>
-            </a:r>
-          </a:p>
-        </p:txBody>
-      </p:sp>
-      <p:sp>
-        <p:nvSpPr>
-          <p:cNvPr id="5" name="TextBox 4">
-            <a:extLst>
-              <a:ext uri="{FF2B5EF4-FFF2-40B4-BE49-F238E27FC236}">
-                <a16:creationId xmlns:a16="http://schemas.microsoft.com/office/drawing/2014/main" id="{6205DA2E-47D7-960B-C784-A608BAE11497}"/>
-              </a:ext>
-            </a:extLst>
-          </p:cNvPr>
-          <p:cNvSpPr txBox="1"/>
-          <p:nvPr/>
-        </p:nvSpPr>
-        <p:spPr>
-          <a:xfrm>
-            <a:off x="292473" y="654441"/>
-            <a:ext cx="11756091" cy="646331"/>
-          </a:xfrm>
-          <a:prstGeom prst="rect">
-            <a:avLst/>
-          </a:prstGeom>
-          <a:noFill/>
-        </p:spPr>
-        <p:txBody>
-          <a:bodyPr wrap="square">
-            <a:spAutoFit/>
-          </a:bodyPr>
-          <a:lstStyle/>
-          <a:p>
-            <a:pPr algn="l"/>
-            <a:r>
-              <a:rPr lang="en-GB" i="0" dirty="0">
+            <a:r>
+              <a:rPr lang="en-GB" sz="1050" b="0" dirty="0">
                 <a:effectLst/>
-                <a:latin typeface="Montserrat" panose="00000500000000000000" pitchFamily="2" charset="0"/>
+                <a:latin typeface="Consolas" panose="020B0609020204030204" pitchFamily="49" charset="0"/>
               </a:rPr>
-              <a:t>Make a list of important, relevant topics,  based on what you know about the  business behind your web application.</a:t>
-            </a:r>
-          </a:p>
-        </p:txBody>
-      </p:sp>
-      <p:sp>
-        <p:nvSpPr>
-          <p:cNvPr id="3" name="TextBox 2">
-            <a:extLst>
-              <a:ext uri="{FF2B5EF4-FFF2-40B4-BE49-F238E27FC236}">
-                <a16:creationId xmlns:a16="http://schemas.microsoft.com/office/drawing/2014/main" id="{DB44F6CF-41E4-94EA-503E-5FA3F6856452}"/>
-              </a:ext>
-            </a:extLst>
-          </p:cNvPr>
-          <p:cNvSpPr txBox="1"/>
-          <p:nvPr/>
-        </p:nvSpPr>
-        <p:spPr>
-          <a:xfrm>
-            <a:off x="292473" y="1759821"/>
-            <a:ext cx="10422597" cy="3108543"/>
-          </a:xfrm>
-          <a:prstGeom prst="rect">
-            <a:avLst/>
-          </a:prstGeom>
-          <a:noFill/>
-        </p:spPr>
-        <p:txBody>
-          <a:bodyPr wrap="none" rtlCol="0">
-            <a:spAutoFit/>
-          </a:bodyPr>
-          <a:lstStyle/>
-          <a:p>
-            <a:pPr marL="285750" indent="-285750">
-              <a:buFont typeface="Arial" panose="020B0604020202020204" pitchFamily="34" charset="0"/>
-              <a:buChar char="•"/>
-            </a:pPr>
-            <a:r>
-              <a:rPr lang="en-GB" dirty="0"/>
-              <a:t>Drones</a:t>
-            </a:r>
-          </a:p>
-          <a:p>
-            <a:pPr marL="285750" indent="-285750">
-              <a:buFont typeface="Arial" panose="020B0604020202020204" pitchFamily="34" charset="0"/>
-              <a:buChar char="•"/>
-            </a:pPr>
-            <a:r>
-              <a:rPr lang="en-GB" dirty="0"/>
-              <a:t>UAVs</a:t>
-            </a:r>
-          </a:p>
-          <a:p>
-            <a:pPr marL="285750" indent="-285750">
-              <a:buFont typeface="Arial" panose="020B0604020202020204" pitchFamily="34" charset="0"/>
-              <a:buChar char="•"/>
-            </a:pPr>
-            <a:r>
-              <a:rPr lang="en-GB" sz="1600" i="0" dirty="0">
-                <a:solidFill>
-                  <a:srgbClr val="202124"/>
-                </a:solidFill>
+              <a:t>C-Soars are a small business based in central London, UK. Their objectives are to increase their sales utilising an e-commerce solution. They are primarily targeting Business to Business consumers, although their services can be provided to Business to Consumers also. Their target market are Housing associations and councils requiring full detailed inspections of their portfolio of properties with the aim of improving health and safety for their residents. Other target markets are large supermarket chains and constructions companies with live projects requiring detailed views of their project progress and safety inspections providing a much faster and safer result, eliminating the use of scaffolding and personnel working at hights.</a:t>
+            </a:r>
+          </a:p>
+          <a:p>
+            <a:br>
+              <a:rPr lang="en-GB" sz="1050" b="0" dirty="0">
                 <a:effectLst/>
-                <a:latin typeface="arial" panose="020B0604020202020204" pitchFamily="34" charset="0"/>
+                <a:latin typeface="Consolas" panose="020B0609020204030204" pitchFamily="49" charset="0"/>
               </a:rPr>
-              <a:t>The term UAS encompasses not only the UAV, but also the person or team on the ground controlling the flight</a:t>
-            </a:r>
-            <a:endParaRPr lang="en-GB" sz="1600" dirty="0"/>
-          </a:p>
-          <a:p>
-            <a:pPr marL="285750" indent="-285750">
-              <a:buFont typeface="Arial" panose="020B0604020202020204" pitchFamily="34" charset="0"/>
-              <a:buChar char="•"/>
-            </a:pPr>
-            <a:r>
-              <a:rPr lang="en-GB" dirty="0"/>
-              <a:t>Surveys</a:t>
-            </a:r>
-          </a:p>
-          <a:p>
-            <a:pPr marL="285750" indent="-285750">
-              <a:buFont typeface="Arial" panose="020B0604020202020204" pitchFamily="34" charset="0"/>
-              <a:buChar char="•"/>
-            </a:pPr>
-            <a:r>
-              <a:rPr lang="en-GB" dirty="0"/>
-              <a:t>Safety</a:t>
-            </a:r>
-          </a:p>
-          <a:p>
-            <a:pPr marL="285750" indent="-285750">
-              <a:buFont typeface="Arial" panose="020B0604020202020204" pitchFamily="34" charset="0"/>
-              <a:buChar char="•"/>
-            </a:pPr>
-            <a:r>
-              <a:rPr lang="en-GB" dirty="0"/>
-              <a:t>No Scaffolding required</a:t>
-            </a:r>
-          </a:p>
-          <a:p>
-            <a:pPr marL="285750" indent="-285750">
-              <a:buFont typeface="Arial" panose="020B0604020202020204" pitchFamily="34" charset="0"/>
-              <a:buChar char="•"/>
-            </a:pPr>
-            <a:r>
-              <a:rPr lang="en-GB" dirty="0"/>
-              <a:t>Fast response</a:t>
-            </a:r>
-          </a:p>
-          <a:p>
-            <a:pPr marL="285750" indent="-285750">
-              <a:buFont typeface="Arial" panose="020B0604020202020204" pitchFamily="34" charset="0"/>
-              <a:buChar char="•"/>
-            </a:pPr>
-            <a:r>
-              <a:rPr lang="en-GB" dirty="0"/>
-              <a:t>Image / Video quality</a:t>
-            </a:r>
-          </a:p>
-          <a:p>
-            <a:pPr marL="285750" indent="-285750">
-              <a:buFont typeface="Arial" panose="020B0604020202020204" pitchFamily="34" charset="0"/>
-              <a:buChar char="•"/>
-            </a:pPr>
-            <a:r>
-              <a:rPr lang="en-GB" dirty="0"/>
-              <a:t>Reports</a:t>
-            </a:r>
-          </a:p>
-          <a:p>
-            <a:pPr marL="285750" indent="-285750">
-              <a:buFont typeface="Arial" panose="020B0604020202020204" pitchFamily="34" charset="0"/>
-              <a:buChar char="•"/>
-            </a:pPr>
-            <a:r>
-              <a:rPr lang="en-GB" dirty="0"/>
-              <a:t>Certified Pilots</a:t>
-            </a:r>
-          </a:p>
-          <a:p>
-            <a:pPr marL="285750" indent="-285750">
-              <a:buFont typeface="Arial" panose="020B0604020202020204" pitchFamily="34" charset="0"/>
-              <a:buChar char="•"/>
-            </a:pPr>
-            <a:r>
-              <a:rPr lang="en-GB" dirty="0"/>
-              <a:t>Qualified / Certified Surveyors</a:t>
-            </a:r>
+            </a:br>
+            <a:r>
+              <a:rPr lang="en-GB" sz="1050" b="0" dirty="0">
+                <a:effectLst/>
+                <a:latin typeface="Consolas" panose="020B0609020204030204" pitchFamily="49" charset="0"/>
+              </a:rPr>
+              <a:t>This application will allow potential clients to view services provided and once registered, clients will be able to view pricing and booking of services and make payments of such services required.</a:t>
+            </a:r>
+          </a:p>
+          <a:p>
+            <a:endParaRPr lang="en-GB" sz="1050" dirty="0"/>
           </a:p>
         </p:txBody>
       </p:sp>
@@ -3584,6 +3909,257 @@
 </file>
 
 <file path=ppt/slides/slide2.xml><?xml version="1.0" encoding="utf-8"?>
+<p:sld xmlns:a="http://schemas.openxmlformats.org/drawingml/2006/main" xmlns:r="http://schemas.openxmlformats.org/officeDocument/2006/relationships" xmlns:p="http://schemas.openxmlformats.org/presentationml/2006/main">
+  <p:cSld>
+    <p:spTree>
+      <p:nvGrpSpPr>
+        <p:cNvPr id="1" name=""/>
+        <p:cNvGrpSpPr/>
+        <p:nvPr/>
+      </p:nvGrpSpPr>
+      <p:grpSpPr>
+        <a:xfrm>
+          <a:off x="0" y="0"/>
+          <a:ext cx="0" cy="0"/>
+          <a:chOff x="0" y="0"/>
+          <a:chExt cx="0" cy="0"/>
+        </a:xfrm>
+      </p:grpSpPr>
+      <p:sp>
+        <p:nvSpPr>
+          <p:cNvPr id="4" name="TextBox 3">
+            <a:extLst>
+              <a:ext uri="{FF2B5EF4-FFF2-40B4-BE49-F238E27FC236}">
+                <a16:creationId xmlns:a16="http://schemas.microsoft.com/office/drawing/2014/main" id="{EC8E180F-7978-8AEF-B7AF-BD5F10A57407}"/>
+              </a:ext>
+            </a:extLst>
+          </p:cNvPr>
+          <p:cNvSpPr txBox="1"/>
+          <p:nvPr/>
+        </p:nvSpPr>
+        <p:spPr>
+          <a:xfrm>
+            <a:off x="0" y="94132"/>
+            <a:ext cx="12192000" cy="369332"/>
+          </a:xfrm>
+          <a:prstGeom prst="rect">
+            <a:avLst/>
+          </a:prstGeom>
+          <a:noFill/>
+        </p:spPr>
+        <p:txBody>
+          <a:bodyPr wrap="square" rtlCol="0">
+            <a:spAutoFit/>
+          </a:bodyPr>
+          <a:lstStyle/>
+          <a:p>
+            <a:pPr algn="ctr"/>
+            <a:r>
+              <a:rPr lang="en-GB" dirty="0"/>
+              <a:t>C-Soars ltd, UAV / Drone Survey Company - SEO</a:t>
+            </a:r>
+          </a:p>
+        </p:txBody>
+      </p:sp>
+      <p:sp>
+        <p:nvSpPr>
+          <p:cNvPr id="5" name="TextBox 4">
+            <a:extLst>
+              <a:ext uri="{FF2B5EF4-FFF2-40B4-BE49-F238E27FC236}">
+                <a16:creationId xmlns:a16="http://schemas.microsoft.com/office/drawing/2014/main" id="{6205DA2E-47D7-960B-C784-A608BAE11497}"/>
+              </a:ext>
+            </a:extLst>
+          </p:cNvPr>
+          <p:cNvSpPr txBox="1"/>
+          <p:nvPr/>
+        </p:nvSpPr>
+        <p:spPr>
+          <a:xfrm>
+            <a:off x="292473" y="654441"/>
+            <a:ext cx="11756091" cy="646331"/>
+          </a:xfrm>
+          <a:prstGeom prst="rect">
+            <a:avLst/>
+          </a:prstGeom>
+          <a:noFill/>
+        </p:spPr>
+        <p:txBody>
+          <a:bodyPr wrap="square">
+            <a:spAutoFit/>
+          </a:bodyPr>
+          <a:lstStyle/>
+          <a:p>
+            <a:pPr algn="l"/>
+            <a:r>
+              <a:rPr lang="en-GB" i="0" dirty="0">
+                <a:effectLst/>
+                <a:latin typeface="Montserrat" panose="00000500000000000000" pitchFamily="2" charset="0"/>
+              </a:rPr>
+              <a:t>Make a list of important, relevant topics,  based on what you know about the  business behind your web application.</a:t>
+            </a:r>
+          </a:p>
+        </p:txBody>
+      </p:sp>
+      <p:sp>
+        <p:nvSpPr>
+          <p:cNvPr id="3" name="TextBox 2">
+            <a:extLst>
+              <a:ext uri="{FF2B5EF4-FFF2-40B4-BE49-F238E27FC236}">
+                <a16:creationId xmlns:a16="http://schemas.microsoft.com/office/drawing/2014/main" id="{DB44F6CF-41E4-94EA-503E-5FA3F6856452}"/>
+              </a:ext>
+            </a:extLst>
+          </p:cNvPr>
+          <p:cNvSpPr txBox="1"/>
+          <p:nvPr/>
+        </p:nvSpPr>
+        <p:spPr>
+          <a:xfrm>
+            <a:off x="292473" y="1759821"/>
+            <a:ext cx="10422597" cy="3108543"/>
+          </a:xfrm>
+          <a:prstGeom prst="rect">
+            <a:avLst/>
+          </a:prstGeom>
+          <a:noFill/>
+        </p:spPr>
+        <p:txBody>
+          <a:bodyPr wrap="none" rtlCol="0">
+            <a:spAutoFit/>
+          </a:bodyPr>
+          <a:lstStyle/>
+          <a:p>
+            <a:pPr marL="285750" indent="-285750">
+              <a:buFont typeface="Arial" panose="020B0604020202020204" pitchFamily="34" charset="0"/>
+              <a:buChar char="•"/>
+            </a:pPr>
+            <a:r>
+              <a:rPr lang="en-GB" dirty="0"/>
+              <a:t>Drones</a:t>
+            </a:r>
+          </a:p>
+          <a:p>
+            <a:pPr marL="285750" indent="-285750">
+              <a:buFont typeface="Arial" panose="020B0604020202020204" pitchFamily="34" charset="0"/>
+              <a:buChar char="•"/>
+            </a:pPr>
+            <a:r>
+              <a:rPr lang="en-GB" dirty="0"/>
+              <a:t>UAVs</a:t>
+            </a:r>
+          </a:p>
+          <a:p>
+            <a:pPr marL="285750" indent="-285750">
+              <a:buFont typeface="Arial" panose="020B0604020202020204" pitchFamily="34" charset="0"/>
+              <a:buChar char="•"/>
+            </a:pPr>
+            <a:r>
+              <a:rPr lang="en-GB" sz="1600" i="0" dirty="0">
+                <a:solidFill>
+                  <a:srgbClr val="202124"/>
+                </a:solidFill>
+                <a:effectLst/>
+                <a:latin typeface="arial" panose="020B0604020202020204" pitchFamily="34" charset="0"/>
+              </a:rPr>
+              <a:t>The term UAS encompasses not only the UAV, but also the person or team on the ground controlling the flight</a:t>
+            </a:r>
+            <a:endParaRPr lang="en-GB" sz="1600" dirty="0"/>
+          </a:p>
+          <a:p>
+            <a:pPr marL="285750" indent="-285750">
+              <a:buFont typeface="Arial" panose="020B0604020202020204" pitchFamily="34" charset="0"/>
+              <a:buChar char="•"/>
+            </a:pPr>
+            <a:r>
+              <a:rPr lang="en-GB" dirty="0"/>
+              <a:t>Surveys</a:t>
+            </a:r>
+          </a:p>
+          <a:p>
+            <a:pPr marL="285750" indent="-285750">
+              <a:buFont typeface="Arial" panose="020B0604020202020204" pitchFamily="34" charset="0"/>
+              <a:buChar char="•"/>
+            </a:pPr>
+            <a:r>
+              <a:rPr lang="en-GB" dirty="0"/>
+              <a:t>Safety</a:t>
+            </a:r>
+          </a:p>
+          <a:p>
+            <a:pPr marL="285750" indent="-285750">
+              <a:buFont typeface="Arial" panose="020B0604020202020204" pitchFamily="34" charset="0"/>
+              <a:buChar char="•"/>
+            </a:pPr>
+            <a:r>
+              <a:rPr lang="en-GB" dirty="0"/>
+              <a:t>No Scaffolding required</a:t>
+            </a:r>
+          </a:p>
+          <a:p>
+            <a:pPr marL="285750" indent="-285750">
+              <a:buFont typeface="Arial" panose="020B0604020202020204" pitchFamily="34" charset="0"/>
+              <a:buChar char="•"/>
+            </a:pPr>
+            <a:r>
+              <a:rPr lang="en-GB" dirty="0"/>
+              <a:t>Fast response</a:t>
+            </a:r>
+          </a:p>
+          <a:p>
+            <a:pPr marL="285750" indent="-285750">
+              <a:buFont typeface="Arial" panose="020B0604020202020204" pitchFamily="34" charset="0"/>
+              <a:buChar char="•"/>
+            </a:pPr>
+            <a:r>
+              <a:rPr lang="en-GB" dirty="0"/>
+              <a:t>Image / Video quality</a:t>
+            </a:r>
+          </a:p>
+          <a:p>
+            <a:pPr marL="285750" indent="-285750">
+              <a:buFont typeface="Arial" panose="020B0604020202020204" pitchFamily="34" charset="0"/>
+              <a:buChar char="•"/>
+            </a:pPr>
+            <a:r>
+              <a:rPr lang="en-GB" dirty="0"/>
+              <a:t>Reports</a:t>
+            </a:r>
+          </a:p>
+          <a:p>
+            <a:pPr marL="285750" indent="-285750">
+              <a:buFont typeface="Arial" panose="020B0604020202020204" pitchFamily="34" charset="0"/>
+              <a:buChar char="•"/>
+            </a:pPr>
+            <a:r>
+              <a:rPr lang="en-GB" dirty="0"/>
+              <a:t>Certified Pilots</a:t>
+            </a:r>
+          </a:p>
+          <a:p>
+            <a:pPr marL="285750" indent="-285750">
+              <a:buFont typeface="Arial" panose="020B0604020202020204" pitchFamily="34" charset="0"/>
+              <a:buChar char="•"/>
+            </a:pPr>
+            <a:r>
+              <a:rPr lang="en-GB" dirty="0"/>
+              <a:t>Qualified / Certified Surveyors</a:t>
+            </a:r>
+          </a:p>
+        </p:txBody>
+      </p:sp>
+    </p:spTree>
+    <p:extLst>
+      <p:ext uri="{BB962C8B-B14F-4D97-AF65-F5344CB8AC3E}">
+        <p14:creationId xmlns:p14="http://schemas.microsoft.com/office/powerpoint/2010/main" val="4067305938"/>
+      </p:ext>
+    </p:extLst>
+  </p:cSld>
+  <p:clrMapOvr>
+    <a:masterClrMapping/>
+  </p:clrMapOvr>
+</p:sld>
+</file>
+
+<file path=ppt/slides/slide3.xml><?xml version="1.0" encoding="utf-8"?>
 <p:sld xmlns:a="http://schemas.openxmlformats.org/drawingml/2006/main" xmlns:r="http://schemas.openxmlformats.org/officeDocument/2006/relationships" xmlns:p="http://schemas.openxmlformats.org/presentationml/2006/main">
   <p:cSld>
     <p:spTree>
@@ -4630,7 +5206,7 @@
 </p:sld>
 </file>
 
-<file path=ppt/slides/slide3.xml><?xml version="1.0" encoding="utf-8"?>
+<file path=ppt/slides/slide4.xml><?xml version="1.0" encoding="utf-8"?>
 <p:sld xmlns:a="http://schemas.openxmlformats.org/drawingml/2006/main" xmlns:r="http://schemas.openxmlformats.org/officeDocument/2006/relationships" xmlns:p="http://schemas.openxmlformats.org/presentationml/2006/main">
   <p:cSld>
     <p:spTree>

</xml_diff>